<commit_message>
Some PowerPoint work on the background.
</commit_message>
<xml_diff>
--- a/Document/Presentation.pptx
+++ b/Document/Presentation.pptx
@@ -5,12 +5,17 @@
     <p:sldMasterId id="2147483648" r:id="rId1"/>
   </p:sldMasterIdLst>
   <p:notesMasterIdLst>
-    <p:notesMasterId r:id="rId5"/>
+    <p:notesMasterId r:id="rId10"/>
   </p:notesMasterIdLst>
   <p:sldIdLst>
     <p:sldId id="256" r:id="rId2"/>
     <p:sldId id="257" r:id="rId3"/>
-    <p:sldId id="258" r:id="rId4"/>
+    <p:sldId id="259" r:id="rId4"/>
+    <p:sldId id="263" r:id="rId5"/>
+    <p:sldId id="260" r:id="rId6"/>
+    <p:sldId id="261" r:id="rId7"/>
+    <p:sldId id="258" r:id="rId8"/>
+    <p:sldId id="262" r:id="rId9"/>
   </p:sldIdLst>
   <p:sldSz cx="9144000" cy="6858000" type="screen4x3"/>
   <p:notesSz cx="6858000" cy="9144000"/>
@@ -210,7 +215,7 @@
           <a:p>
             <a:fld id="{DC2E9FED-4A5A-440E-9ADD-96E04009DFF9}" type="datetimeFigureOut">
               <a:rPr lang="en-US" smtClean="0"/>
-              <a:t>12/2/2016</a:t>
+              <a:t>2016-12-06</a:t>
             </a:fld>
             <a:endParaRPr lang="en-US"/>
           </a:p>
@@ -735,7 +740,7 @@
             <a:fld id="{9ED4560C-E380-1943-B5D7-49A23CA338C0}" type="datetimeFigureOut">
               <a:rPr lang="en-US" smtClean="0"/>
               <a:pPr/>
-              <a:t>12/2/2016</a:t>
+              <a:t>2016-12-06</a:t>
             </a:fld>
             <a:endParaRPr lang="en-US"/>
           </a:p>
@@ -905,7 +910,7 @@
             <a:fld id="{9ED4560C-E380-1943-B5D7-49A23CA338C0}" type="datetimeFigureOut">
               <a:rPr lang="en-US" smtClean="0"/>
               <a:pPr/>
-              <a:t>12/2/2016</a:t>
+              <a:t>2016-12-06</a:t>
             </a:fld>
             <a:endParaRPr lang="en-US"/>
           </a:p>
@@ -1085,7 +1090,7 @@
             <a:fld id="{9ED4560C-E380-1943-B5D7-49A23CA338C0}" type="datetimeFigureOut">
               <a:rPr lang="en-US" smtClean="0"/>
               <a:pPr/>
-              <a:t>12/2/2016</a:t>
+              <a:t>2016-12-06</a:t>
             </a:fld>
             <a:endParaRPr lang="en-US"/>
           </a:p>
@@ -1255,7 +1260,7 @@
             <a:fld id="{9ED4560C-E380-1943-B5D7-49A23CA338C0}" type="datetimeFigureOut">
               <a:rPr lang="en-US" smtClean="0"/>
               <a:pPr/>
-              <a:t>12/2/2016</a:t>
+              <a:t>2016-12-06</a:t>
             </a:fld>
             <a:endParaRPr lang="en-US"/>
           </a:p>
@@ -1502,7 +1507,7 @@
             <a:fld id="{9ED4560C-E380-1943-B5D7-49A23CA338C0}" type="datetimeFigureOut">
               <a:rPr lang="en-US" smtClean="0"/>
               <a:pPr/>
-              <a:t>12/2/2016</a:t>
+              <a:t>2016-12-06</a:t>
             </a:fld>
             <a:endParaRPr lang="en-US"/>
           </a:p>
@@ -1789,7 +1794,7 @@
             <a:fld id="{9ED4560C-E380-1943-B5D7-49A23CA338C0}" type="datetimeFigureOut">
               <a:rPr lang="en-US" smtClean="0"/>
               <a:pPr/>
-              <a:t>12/2/2016</a:t>
+              <a:t>2016-12-06</a:t>
             </a:fld>
             <a:endParaRPr lang="en-US"/>
           </a:p>
@@ -2210,7 +2215,7 @@
             <a:fld id="{9ED4560C-E380-1943-B5D7-49A23CA338C0}" type="datetimeFigureOut">
               <a:rPr lang="en-US" smtClean="0"/>
               <a:pPr/>
-              <a:t>12/2/2016</a:t>
+              <a:t>2016-12-06</a:t>
             </a:fld>
             <a:endParaRPr lang="en-US"/>
           </a:p>
@@ -2329,7 +2334,7 @@
             <a:fld id="{9ED4560C-E380-1943-B5D7-49A23CA338C0}" type="datetimeFigureOut">
               <a:rPr lang="en-US" smtClean="0"/>
               <a:pPr/>
-              <a:t>12/2/2016</a:t>
+              <a:t>2016-12-06</a:t>
             </a:fld>
             <a:endParaRPr lang="en-US"/>
           </a:p>
@@ -2426,7 +2431,7 @@
             <a:fld id="{9ED4560C-E380-1943-B5D7-49A23CA338C0}" type="datetimeFigureOut">
               <a:rPr lang="en-US" smtClean="0"/>
               <a:pPr/>
-              <a:t>12/2/2016</a:t>
+              <a:t>2016-12-06</a:t>
             </a:fld>
             <a:endParaRPr lang="en-US"/>
           </a:p>
@@ -2703,7 +2708,7 @@
             <a:fld id="{9ED4560C-E380-1943-B5D7-49A23CA338C0}" type="datetimeFigureOut">
               <a:rPr lang="en-US" smtClean="0"/>
               <a:pPr/>
-              <a:t>12/2/2016</a:t>
+              <a:t>2016-12-06</a:t>
             </a:fld>
             <a:endParaRPr lang="en-US"/>
           </a:p>
@@ -2957,7 +2962,7 @@
             <a:fld id="{9ED4560C-E380-1943-B5D7-49A23CA338C0}" type="datetimeFigureOut">
               <a:rPr lang="en-US" smtClean="0"/>
               <a:pPr/>
-              <a:t>12/2/2016</a:t>
+              <a:t>2016-12-06</a:t>
             </a:fld>
             <a:endParaRPr lang="en-US"/>
           </a:p>
@@ -3170,7 +3175,7 @@
             <a:fld id="{9ED4560C-E380-1943-B5D7-49A23CA338C0}" type="datetimeFigureOut">
               <a:rPr lang="en-US" smtClean="0"/>
               <a:pPr/>
-              <a:t>12/2/2016</a:t>
+              <a:t>2016-12-06</a:t>
             </a:fld>
             <a:endParaRPr lang="en-US"/>
           </a:p>
@@ -3658,7 +3663,7 @@
           <a:p>
             <a:fld id="{7E5193C8-7A68-449C-8791-1C9B35186869}" type="datetime1">
               <a:rPr lang="en-US" smtClean="0"/>
-              <a:t>12/2/2016</a:t>
+              <a:t>2016-12-06</a:t>
             </a:fld>
             <a:endParaRPr lang="en-US"/>
           </a:p>
@@ -3718,8 +3723,12 @@
           <a:p>
             <a:pPr algn="l"/>
             <a:r>
-              <a:rPr lang="en-US" dirty="0"/>
-              <a:t>Project Motivation</a:t>
+              <a:rPr lang="en-US" dirty="0">
+                <a:solidFill>
+                  <a:schemeClr val="bg1"/>
+                </a:solidFill>
+              </a:rPr>
+              <a:t>Motivation</a:t>
             </a:r>
           </a:p>
         </p:txBody>
@@ -3797,7 +3806,579 @@
           <a:p>
             <a:pPr algn="l"/>
             <a:r>
+              <a:rPr lang="en-US" dirty="0">
+                <a:solidFill>
+                  <a:schemeClr val="bg1"/>
+                </a:solidFill>
+              </a:rPr>
+              <a:t>Background</a:t>
+            </a:r>
+          </a:p>
+        </p:txBody>
+      </p:sp>
+      <p:sp>
+        <p:nvSpPr>
+          <p:cNvPr id="3" name="Content Placeholder 2"/>
+          <p:cNvSpPr>
+            <a:spLocks noGrp="1"/>
+          </p:cNvSpPr>
+          <p:nvPr>
+            <p:ph idx="1"/>
+          </p:nvPr>
+        </p:nvSpPr>
+        <p:spPr/>
+        <p:txBody>
+          <a:bodyPr>
+            <a:normAutofit fontScale="92500" lnSpcReduction="20000"/>
+          </a:bodyPr>
+          <a:lstStyle/>
+          <a:p>
+            <a:r>
               <a:rPr lang="en-US" dirty="0"/>
+              <a:t>Featherweight Java (Igarashi 2001)</a:t>
+            </a:r>
+          </a:p>
+          <a:p>
+            <a:pPr lvl="1"/>
+            <a:r>
+              <a:rPr lang="en-US" dirty="0"/>
+              <a:t>“A minimal core calculus for Java and GJ”</a:t>
+            </a:r>
+          </a:p>
+          <a:p>
+            <a:pPr lvl="1"/>
+            <a:r>
+              <a:rPr lang="en-US" dirty="0"/>
+              <a:t>Omits: </a:t>
+            </a:r>
+            <a:r>
+              <a:rPr lang="en-US" dirty="0"/>
+              <a:t>assignment, interfaces, overloading, messages to </a:t>
+            </a:r>
+            <a:r>
+              <a:rPr lang="en-US" dirty="0">
+                <a:latin typeface="Courier New" panose="02070309020205020404" pitchFamily="49" charset="0"/>
+                <a:cs typeface="Courier New" panose="02070309020205020404" pitchFamily="49" charset="0"/>
+              </a:rPr>
+              <a:t>super</a:t>
+            </a:r>
+            <a:r>
+              <a:rPr lang="en-US" dirty="0"/>
+              <a:t>, null pointers, base types (</a:t>
+            </a:r>
+            <a:r>
+              <a:rPr lang="en-US" dirty="0" err="1">
+                <a:latin typeface="Courier New" panose="02070309020205020404" pitchFamily="49" charset="0"/>
+                <a:cs typeface="Courier New" panose="02070309020205020404" pitchFamily="49" charset="0"/>
+              </a:rPr>
+              <a:t>int</a:t>
+            </a:r>
+            <a:r>
+              <a:rPr lang="en-US" dirty="0"/>
+              <a:t>, </a:t>
+            </a:r>
+            <a:r>
+              <a:rPr lang="en-US" dirty="0">
+                <a:latin typeface="Courier New" panose="02070309020205020404" pitchFamily="49" charset="0"/>
+                <a:cs typeface="Courier New" panose="02070309020205020404" pitchFamily="49" charset="0"/>
+              </a:rPr>
+              <a:t>bool</a:t>
+            </a:r>
+            <a:r>
+              <a:rPr lang="en-US" dirty="0"/>
+              <a:t>, etc.), abstract method declarations, shadowing of superclass fields by subclass fields, access control (</a:t>
+            </a:r>
+            <a:r>
+              <a:rPr lang="en-US" dirty="0">
+                <a:latin typeface="Courier New" panose="02070309020205020404" pitchFamily="49" charset="0"/>
+                <a:cs typeface="Courier New" panose="02070309020205020404" pitchFamily="49" charset="0"/>
+              </a:rPr>
+              <a:t>public</a:t>
+            </a:r>
+            <a:r>
+              <a:rPr lang="en-US" dirty="0"/>
+              <a:t>, </a:t>
+            </a:r>
+            <a:r>
+              <a:rPr lang="en-US" dirty="0">
+                <a:latin typeface="Courier New" panose="02070309020205020404" pitchFamily="49" charset="0"/>
+                <a:cs typeface="Courier New" panose="02070309020205020404" pitchFamily="49" charset="0"/>
+              </a:rPr>
+              <a:t>private</a:t>
+            </a:r>
+            <a:r>
+              <a:rPr lang="en-US" dirty="0"/>
+              <a:t>, etc.), and exceptions</a:t>
+            </a:r>
+          </a:p>
+          <a:p>
+            <a:pPr lvl="1"/>
+            <a:r>
+              <a:rPr lang="en-US" dirty="0"/>
+              <a:t>Includes: mutually recursive class definitions, object creation, field access, method invocation, method override, method recursion through </a:t>
+            </a:r>
+            <a:r>
+              <a:rPr lang="en-US" dirty="0">
+                <a:latin typeface="Courier New" panose="02070309020205020404" pitchFamily="49" charset="0"/>
+                <a:cs typeface="Courier New" panose="02070309020205020404" pitchFamily="49" charset="0"/>
+              </a:rPr>
+              <a:t>this</a:t>
+            </a:r>
+            <a:r>
+              <a:rPr lang="en-US" dirty="0"/>
+              <a:t>, subtyping, and casting</a:t>
+            </a:r>
+            <a:br>
+              <a:rPr lang="en-US" dirty="0"/>
+            </a:br>
+            <a:endParaRPr lang="en-US" dirty="0"/>
+          </a:p>
+        </p:txBody>
+      </p:sp>
+    </p:spTree>
+    <p:extLst>
+      <p:ext uri="{BB962C8B-B14F-4D97-AF65-F5344CB8AC3E}">
+        <p14:creationId xmlns:p14="http://schemas.microsoft.com/office/powerpoint/2010/main" val="3566154295"/>
+      </p:ext>
+    </p:extLst>
+  </p:cSld>
+  <p:clrMapOvr>
+    <a:masterClrMapping/>
+  </p:clrMapOvr>
+</p:sld>
+</file>
+
+<file path=ppt/slides/slide4.xml><?xml version="1.0" encoding="utf-8"?>
+<p:sld xmlns:a="http://schemas.openxmlformats.org/drawingml/2006/main" xmlns:r="http://schemas.openxmlformats.org/officeDocument/2006/relationships" xmlns:p="http://schemas.openxmlformats.org/presentationml/2006/main">
+  <p:cSld>
+    <p:spTree>
+      <p:nvGrpSpPr>
+        <p:cNvPr id="1" name=""/>
+        <p:cNvGrpSpPr/>
+        <p:nvPr/>
+      </p:nvGrpSpPr>
+      <p:grpSpPr>
+        <a:xfrm>
+          <a:off x="0" y="0"/>
+          <a:ext cx="0" cy="0"/>
+          <a:chOff x="0" y="0"/>
+          <a:chExt cx="0" cy="0"/>
+        </a:xfrm>
+      </p:grpSpPr>
+      <p:sp>
+        <p:nvSpPr>
+          <p:cNvPr id="2" name="Title 1"/>
+          <p:cNvSpPr>
+            <a:spLocks noGrp="1"/>
+          </p:cNvSpPr>
+          <p:nvPr>
+            <p:ph type="title"/>
+          </p:nvPr>
+        </p:nvSpPr>
+        <p:spPr>
+          <a:xfrm>
+            <a:off x="2024743" y="97357"/>
+            <a:ext cx="5262464" cy="639762"/>
+          </a:xfrm>
+        </p:spPr>
+        <p:txBody>
+          <a:bodyPr>
+            <a:normAutofit fontScale="90000"/>
+          </a:bodyPr>
+          <a:lstStyle/>
+          <a:p>
+            <a:pPr algn="l"/>
+            <a:r>
+              <a:rPr lang="en-US" dirty="0">
+                <a:solidFill>
+                  <a:schemeClr val="bg1"/>
+                </a:solidFill>
+              </a:rPr>
+              <a:t>Background</a:t>
+            </a:r>
+          </a:p>
+        </p:txBody>
+      </p:sp>
+      <p:sp>
+        <p:nvSpPr>
+          <p:cNvPr id="3" name="Content Placeholder 2"/>
+          <p:cNvSpPr>
+            <a:spLocks noGrp="1"/>
+          </p:cNvSpPr>
+          <p:nvPr>
+            <p:ph idx="1"/>
+          </p:nvPr>
+        </p:nvSpPr>
+        <p:spPr/>
+        <p:txBody>
+          <a:bodyPr>
+            <a:normAutofit fontScale="92500" lnSpcReduction="20000"/>
+          </a:bodyPr>
+          <a:lstStyle/>
+          <a:p>
+            <a:r>
+              <a:rPr lang="en-US" dirty="0"/>
+              <a:t>Featherweight Java (Igarashi 2001) </a:t>
+            </a:r>
+            <a:r>
+              <a:rPr lang="en-US" dirty="0">
+                <a:solidFill>
+                  <a:srgbClr val="FF0000"/>
+                </a:solidFill>
+              </a:rPr>
+              <a:t>(no casting)</a:t>
+            </a:r>
+          </a:p>
+          <a:p>
+            <a:pPr lvl="1"/>
+            <a:r>
+              <a:rPr lang="en-US" dirty="0"/>
+              <a:t>“A minimal core calculus for Java and GJ”</a:t>
+            </a:r>
+          </a:p>
+          <a:p>
+            <a:pPr lvl="1"/>
+            <a:r>
+              <a:rPr lang="en-US" dirty="0"/>
+              <a:t>Omits: </a:t>
+            </a:r>
+            <a:r>
+              <a:rPr lang="en-US" dirty="0"/>
+              <a:t>assignment, interfaces, overloading, messages to </a:t>
+            </a:r>
+            <a:r>
+              <a:rPr lang="en-US" dirty="0">
+                <a:latin typeface="Courier New" panose="02070309020205020404" pitchFamily="49" charset="0"/>
+                <a:cs typeface="Courier New" panose="02070309020205020404" pitchFamily="49" charset="0"/>
+              </a:rPr>
+              <a:t>super</a:t>
+            </a:r>
+            <a:r>
+              <a:rPr lang="en-US" dirty="0"/>
+              <a:t>, null pointers, base types (</a:t>
+            </a:r>
+            <a:r>
+              <a:rPr lang="en-US" dirty="0" err="1">
+                <a:latin typeface="Courier New" panose="02070309020205020404" pitchFamily="49" charset="0"/>
+                <a:cs typeface="Courier New" panose="02070309020205020404" pitchFamily="49" charset="0"/>
+              </a:rPr>
+              <a:t>int</a:t>
+            </a:r>
+            <a:r>
+              <a:rPr lang="en-US" dirty="0"/>
+              <a:t>, </a:t>
+            </a:r>
+            <a:r>
+              <a:rPr lang="en-US" dirty="0">
+                <a:latin typeface="Courier New" panose="02070309020205020404" pitchFamily="49" charset="0"/>
+                <a:cs typeface="Courier New" panose="02070309020205020404" pitchFamily="49" charset="0"/>
+              </a:rPr>
+              <a:t>bool</a:t>
+            </a:r>
+            <a:r>
+              <a:rPr lang="en-US" dirty="0"/>
+              <a:t>, etc.), abstract method declarations, shadowing of superclass fields by subclass fields, access control (</a:t>
+            </a:r>
+            <a:r>
+              <a:rPr lang="en-US" dirty="0">
+                <a:latin typeface="Courier New" panose="02070309020205020404" pitchFamily="49" charset="0"/>
+                <a:cs typeface="Courier New" panose="02070309020205020404" pitchFamily="49" charset="0"/>
+              </a:rPr>
+              <a:t>public</a:t>
+            </a:r>
+            <a:r>
+              <a:rPr lang="en-US" dirty="0"/>
+              <a:t>, </a:t>
+            </a:r>
+            <a:r>
+              <a:rPr lang="en-US" dirty="0">
+                <a:latin typeface="Courier New" panose="02070309020205020404" pitchFamily="49" charset="0"/>
+                <a:cs typeface="Courier New" panose="02070309020205020404" pitchFamily="49" charset="0"/>
+              </a:rPr>
+              <a:t>private</a:t>
+            </a:r>
+            <a:r>
+              <a:rPr lang="en-US" dirty="0"/>
+              <a:t>, etc.), and exceptions</a:t>
+            </a:r>
+          </a:p>
+          <a:p>
+            <a:pPr lvl="1"/>
+            <a:r>
+              <a:rPr lang="en-US" dirty="0"/>
+              <a:t>Includes: mutually recursive class definitions, object creation, field access, method invocation</a:t>
+            </a:r>
+            <a:r>
+              <a:rPr lang="en-US" strike="sngStrike" dirty="0">
+                <a:solidFill>
+                  <a:srgbClr val="FF0000"/>
+                </a:solidFill>
+              </a:rPr>
+              <a:t>, method override</a:t>
+            </a:r>
+            <a:r>
+              <a:rPr lang="en-US" dirty="0"/>
+              <a:t>,</a:t>
+            </a:r>
+            <a:r>
+              <a:rPr lang="en-US" dirty="0">
+                <a:solidFill>
+                  <a:srgbClr val="FF0000"/>
+                </a:solidFill>
+              </a:rPr>
+              <a:t> </a:t>
+            </a:r>
+            <a:r>
+              <a:rPr lang="en-US" dirty="0"/>
+              <a:t>method recursion through </a:t>
+            </a:r>
+            <a:r>
+              <a:rPr lang="en-US" dirty="0">
+                <a:latin typeface="Courier New" panose="02070309020205020404" pitchFamily="49" charset="0"/>
+                <a:cs typeface="Courier New" panose="02070309020205020404" pitchFamily="49" charset="0"/>
+              </a:rPr>
+              <a:t>this</a:t>
+            </a:r>
+            <a:r>
+              <a:rPr lang="en-US" strike="sngStrike" dirty="0">
+                <a:solidFill>
+                  <a:srgbClr val="FF0000"/>
+                </a:solidFill>
+              </a:rPr>
+              <a:t>, subtyping, and casting</a:t>
+            </a:r>
+            <a:br>
+              <a:rPr lang="en-US" dirty="0"/>
+            </a:br>
+            <a:endParaRPr lang="en-US" dirty="0"/>
+          </a:p>
+        </p:txBody>
+      </p:sp>
+    </p:spTree>
+    <p:extLst>
+      <p:ext uri="{BB962C8B-B14F-4D97-AF65-F5344CB8AC3E}">
+        <p14:creationId xmlns:p14="http://schemas.microsoft.com/office/powerpoint/2010/main" val="64831200"/>
+      </p:ext>
+    </p:extLst>
+  </p:cSld>
+  <p:clrMapOvr>
+    <a:masterClrMapping/>
+  </p:clrMapOvr>
+</p:sld>
+</file>
+
+<file path=ppt/slides/slide5.xml><?xml version="1.0" encoding="utf-8"?>
+<p:sld xmlns:a="http://schemas.openxmlformats.org/drawingml/2006/main" xmlns:r="http://schemas.openxmlformats.org/officeDocument/2006/relationships" xmlns:p="http://schemas.openxmlformats.org/presentationml/2006/main">
+  <p:cSld>
+    <p:spTree>
+      <p:nvGrpSpPr>
+        <p:cNvPr id="1" name=""/>
+        <p:cNvGrpSpPr/>
+        <p:nvPr/>
+      </p:nvGrpSpPr>
+      <p:grpSpPr>
+        <a:xfrm>
+          <a:off x="0" y="0"/>
+          <a:ext cx="0" cy="0"/>
+          <a:chOff x="0" y="0"/>
+          <a:chExt cx="0" cy="0"/>
+        </a:xfrm>
+      </p:grpSpPr>
+      <p:sp>
+        <p:nvSpPr>
+          <p:cNvPr id="2" name="Title 1"/>
+          <p:cNvSpPr>
+            <a:spLocks noGrp="1"/>
+          </p:cNvSpPr>
+          <p:nvPr>
+            <p:ph type="title"/>
+          </p:nvPr>
+        </p:nvSpPr>
+        <p:spPr>
+          <a:xfrm>
+            <a:off x="2024743" y="97357"/>
+            <a:ext cx="5262464" cy="639762"/>
+          </a:xfrm>
+        </p:spPr>
+        <p:txBody>
+          <a:bodyPr>
+            <a:normAutofit fontScale="90000"/>
+          </a:bodyPr>
+          <a:lstStyle/>
+          <a:p>
+            <a:pPr algn="l"/>
+            <a:r>
+              <a:rPr lang="en-US" dirty="0">
+                <a:solidFill>
+                  <a:schemeClr val="bg1"/>
+                </a:solidFill>
+              </a:rPr>
+              <a:t>Objectives</a:t>
+            </a:r>
+          </a:p>
+        </p:txBody>
+      </p:sp>
+      <p:sp>
+        <p:nvSpPr>
+          <p:cNvPr id="3" name="Content Placeholder 2"/>
+          <p:cNvSpPr>
+            <a:spLocks noGrp="1"/>
+          </p:cNvSpPr>
+          <p:nvPr>
+            <p:ph idx="1"/>
+          </p:nvPr>
+        </p:nvSpPr>
+        <p:spPr/>
+        <p:txBody>
+          <a:bodyPr/>
+          <a:lstStyle/>
+          <a:p>
+            <a:endParaRPr lang="en-US" dirty="0"/>
+          </a:p>
+        </p:txBody>
+      </p:sp>
+    </p:spTree>
+    <p:extLst>
+      <p:ext uri="{BB962C8B-B14F-4D97-AF65-F5344CB8AC3E}">
+        <p14:creationId xmlns:p14="http://schemas.microsoft.com/office/powerpoint/2010/main" val="3710877300"/>
+      </p:ext>
+    </p:extLst>
+  </p:cSld>
+  <p:clrMapOvr>
+    <a:masterClrMapping/>
+  </p:clrMapOvr>
+</p:sld>
+</file>
+
+<file path=ppt/slides/slide6.xml><?xml version="1.0" encoding="utf-8"?>
+<p:sld xmlns:a="http://schemas.openxmlformats.org/drawingml/2006/main" xmlns:r="http://schemas.openxmlformats.org/officeDocument/2006/relationships" xmlns:p="http://schemas.openxmlformats.org/presentationml/2006/main">
+  <p:cSld>
+    <p:spTree>
+      <p:nvGrpSpPr>
+        <p:cNvPr id="1" name=""/>
+        <p:cNvGrpSpPr/>
+        <p:nvPr/>
+      </p:nvGrpSpPr>
+      <p:grpSpPr>
+        <a:xfrm>
+          <a:off x="0" y="0"/>
+          <a:ext cx="0" cy="0"/>
+          <a:chOff x="0" y="0"/>
+          <a:chExt cx="0" cy="0"/>
+        </a:xfrm>
+      </p:grpSpPr>
+      <p:sp>
+        <p:nvSpPr>
+          <p:cNvPr id="2" name="Title 1"/>
+          <p:cNvSpPr>
+            <a:spLocks noGrp="1"/>
+          </p:cNvSpPr>
+          <p:nvPr>
+            <p:ph type="title"/>
+          </p:nvPr>
+        </p:nvSpPr>
+        <p:spPr>
+          <a:xfrm>
+            <a:off x="2024743" y="97357"/>
+            <a:ext cx="5262464" cy="639762"/>
+          </a:xfrm>
+        </p:spPr>
+        <p:txBody>
+          <a:bodyPr>
+            <a:normAutofit fontScale="90000"/>
+          </a:bodyPr>
+          <a:lstStyle/>
+          <a:p>
+            <a:pPr algn="l"/>
+            <a:r>
+              <a:rPr lang="en-US" dirty="0">
+                <a:solidFill>
+                  <a:schemeClr val="bg1"/>
+                </a:solidFill>
+              </a:rPr>
+              <a:t>Evaluator</a:t>
+            </a:r>
+          </a:p>
+        </p:txBody>
+      </p:sp>
+      <p:sp>
+        <p:nvSpPr>
+          <p:cNvPr id="3" name="Content Placeholder 2"/>
+          <p:cNvSpPr>
+            <a:spLocks noGrp="1"/>
+          </p:cNvSpPr>
+          <p:nvPr>
+            <p:ph idx="1"/>
+          </p:nvPr>
+        </p:nvSpPr>
+        <p:spPr/>
+        <p:txBody>
+          <a:bodyPr/>
+          <a:lstStyle/>
+          <a:p>
+            <a:endParaRPr lang="en-US" dirty="0"/>
+          </a:p>
+        </p:txBody>
+      </p:sp>
+    </p:spTree>
+    <p:extLst>
+      <p:ext uri="{BB962C8B-B14F-4D97-AF65-F5344CB8AC3E}">
+        <p14:creationId xmlns:p14="http://schemas.microsoft.com/office/powerpoint/2010/main" val="4177885040"/>
+      </p:ext>
+    </p:extLst>
+  </p:cSld>
+  <p:clrMapOvr>
+    <a:masterClrMapping/>
+  </p:clrMapOvr>
+</p:sld>
+</file>
+
+<file path=ppt/slides/slide7.xml><?xml version="1.0" encoding="utf-8"?>
+<p:sld xmlns:a="http://schemas.openxmlformats.org/drawingml/2006/main" xmlns:r="http://schemas.openxmlformats.org/officeDocument/2006/relationships" xmlns:p="http://schemas.openxmlformats.org/presentationml/2006/main">
+  <p:cSld>
+    <p:spTree>
+      <p:nvGrpSpPr>
+        <p:cNvPr id="1" name=""/>
+        <p:cNvGrpSpPr/>
+        <p:nvPr/>
+      </p:nvGrpSpPr>
+      <p:grpSpPr>
+        <a:xfrm>
+          <a:off x="0" y="0"/>
+          <a:ext cx="0" cy="0"/>
+          <a:chOff x="0" y="0"/>
+          <a:chExt cx="0" cy="0"/>
+        </a:xfrm>
+      </p:grpSpPr>
+      <p:sp>
+        <p:nvSpPr>
+          <p:cNvPr id="2" name="Title 1"/>
+          <p:cNvSpPr>
+            <a:spLocks noGrp="1"/>
+          </p:cNvSpPr>
+          <p:nvPr>
+            <p:ph type="title"/>
+          </p:nvPr>
+        </p:nvSpPr>
+        <p:spPr>
+          <a:xfrm>
+            <a:off x="2024743" y="97357"/>
+            <a:ext cx="5262464" cy="639762"/>
+          </a:xfrm>
+        </p:spPr>
+        <p:txBody>
+          <a:bodyPr>
+            <a:normAutofit fontScale="90000"/>
+          </a:bodyPr>
+          <a:lstStyle/>
+          <a:p>
+            <a:pPr algn="l"/>
+            <a:r>
+              <a:rPr lang="en-US" dirty="0">
+                <a:solidFill>
+                  <a:schemeClr val="bg1"/>
+                </a:solidFill>
+              </a:rPr>
               <a:t>Example</a:t>
             </a:r>
           </a:p>
@@ -3826,6 +4407,89 @@
     <p:extLst>
       <p:ext uri="{BB962C8B-B14F-4D97-AF65-F5344CB8AC3E}">
         <p14:creationId xmlns:p14="http://schemas.microsoft.com/office/powerpoint/2010/main" val="3087471823"/>
+      </p:ext>
+    </p:extLst>
+  </p:cSld>
+  <p:clrMapOvr>
+    <a:masterClrMapping/>
+  </p:clrMapOvr>
+</p:sld>
+</file>
+
+<file path=ppt/slides/slide8.xml><?xml version="1.0" encoding="utf-8"?>
+<p:sld xmlns:a="http://schemas.openxmlformats.org/drawingml/2006/main" xmlns:r="http://schemas.openxmlformats.org/officeDocument/2006/relationships" xmlns:p="http://schemas.openxmlformats.org/presentationml/2006/main">
+  <p:cSld>
+    <p:spTree>
+      <p:nvGrpSpPr>
+        <p:cNvPr id="1" name=""/>
+        <p:cNvGrpSpPr/>
+        <p:nvPr/>
+      </p:nvGrpSpPr>
+      <p:grpSpPr>
+        <a:xfrm>
+          <a:off x="0" y="0"/>
+          <a:ext cx="0" cy="0"/>
+          <a:chOff x="0" y="0"/>
+          <a:chExt cx="0" cy="0"/>
+        </a:xfrm>
+      </p:grpSpPr>
+      <p:sp>
+        <p:nvSpPr>
+          <p:cNvPr id="2" name="Title 1"/>
+          <p:cNvSpPr>
+            <a:spLocks noGrp="1"/>
+          </p:cNvSpPr>
+          <p:nvPr>
+            <p:ph type="title"/>
+          </p:nvPr>
+        </p:nvSpPr>
+        <p:spPr>
+          <a:xfrm>
+            <a:off x="2024743" y="97357"/>
+            <a:ext cx="5262464" cy="639762"/>
+          </a:xfrm>
+        </p:spPr>
+        <p:txBody>
+          <a:bodyPr>
+            <a:normAutofit fontScale="90000"/>
+          </a:bodyPr>
+          <a:lstStyle/>
+          <a:p>
+            <a:pPr algn="l"/>
+            <a:r>
+              <a:rPr lang="en-US" dirty="0">
+                <a:solidFill>
+                  <a:schemeClr val="bg1"/>
+                </a:solidFill>
+              </a:rPr>
+              <a:t>Difficulties</a:t>
+            </a:r>
+          </a:p>
+        </p:txBody>
+      </p:sp>
+      <p:sp>
+        <p:nvSpPr>
+          <p:cNvPr id="3" name="Content Placeholder 2"/>
+          <p:cNvSpPr>
+            <a:spLocks noGrp="1"/>
+          </p:cNvSpPr>
+          <p:nvPr>
+            <p:ph idx="1"/>
+          </p:nvPr>
+        </p:nvSpPr>
+        <p:spPr/>
+        <p:txBody>
+          <a:bodyPr/>
+          <a:lstStyle/>
+          <a:p>
+            <a:endParaRPr lang="en-US" dirty="0"/>
+          </a:p>
+        </p:txBody>
+      </p:sp>
+    </p:spTree>
+    <p:extLst>
+      <p:ext uri="{BB962C8B-B14F-4D97-AF65-F5344CB8AC3E}">
+        <p14:creationId xmlns:p14="http://schemas.microsoft.com/office/powerpoint/2010/main" val="2708905503"/>
       </p:ext>
     </p:extLst>
   </p:cSld>

</xml_diff>